<commit_message>
Update MIPS slide and add final modeling report PDF
</commit_message>
<xml_diff>
--- a/outputs/MIPS_By_Specialty_Summary.pptx
+++ b/outputs/MIPS_By_Specialty_Summary.pptx
@@ -5,7 +5,8 @@
     <p:sldMasterId id="2147483648" r:id="rId1"/>
   </p:sldMasterIdLst>
   <p:sldIdLst>
-    <p:sldId id="256" r:id="rId7"/>
+    <p:sldId id="256" r:id="rId2"/>
+    <p:sldId id="258" r:id="rId3"/>
   </p:sldIdLst>
   <p:sldSz cx="9144000" cy="6858000" type="screen4x3"/>
   <p:notesSz cx="6858000" cy="9144000"/>
@@ -104,6 +105,22 @@
       </a:defRPr>
     </a:lvl9pPr>
   </p:defaultTextStyle>
+  <p:extLst>
+    <p:ext uri="{EFAFB233-063F-42B5-8137-9DF3F51BA10A}">
+      <p15:sldGuideLst xmlns:p15="http://schemas.microsoft.com/office/powerpoint/2012/main">
+        <p15:guide id="1" orient="horz" pos="2160">
+          <p15:clr>
+            <a:srgbClr val="A4A3A4"/>
+          </p15:clr>
+        </p15:guide>
+        <p15:guide id="2" pos="2880">
+          <p15:clr>
+            <a:srgbClr val="A4A3A4"/>
+          </p15:clr>
+        </p15:guide>
+      </p15:sldGuideLst>
+    </p:ext>
+  </p:extLst>
 </p:presentation>
 </file>
 
@@ -145,10 +162,9 @@
           <a:lstStyle/>
           <a:p>
             <a:r>
-              <a:rPr lang="en-US" smtClean="0"/>
+              <a:rPr lang="en-US"/>
               <a:t>Click to edit Master title style</a:t>
             </a:r>
-            <a:endParaRPr lang="en-US"/>
           </a:p>
         </p:txBody>
       </p:sp>
@@ -264,10 +280,9 @@
           </a:lstStyle>
           <a:p>
             <a:r>
-              <a:rPr lang="en-US" smtClean="0"/>
+              <a:rPr lang="en-US"/>
               <a:t>Click to edit Master subtitle style</a:t>
             </a:r>
-            <a:endParaRPr lang="en-US"/>
           </a:p>
         </p:txBody>
       </p:sp>
@@ -288,7 +303,7 @@
           <a:p>
             <a:fld id="{5BCAD085-E8A6-8845-BD4E-CB4CCA059FC4}" type="datetimeFigureOut">
               <a:rPr lang="en-US" smtClean="0"/>
-              <a:t>1/27/13</a:t>
+              <a:t>4/22/2025</a:t>
             </a:fld>
             <a:endParaRPr lang="en-US"/>
           </a:p>
@@ -382,10 +397,9 @@
           <a:lstStyle/>
           <a:p>
             <a:r>
-              <a:rPr lang="en-US" smtClean="0"/>
+              <a:rPr lang="en-US"/>
               <a:t>Click to edit Master title style</a:t>
             </a:r>
-            <a:endParaRPr lang="en-US"/>
           </a:p>
         </p:txBody>
       </p:sp>
@@ -406,38 +420,37 @@
           <a:p>
             <a:pPr lvl="0"/>
             <a:r>
-              <a:rPr lang="en-US" smtClean="0"/>
+              <a:rPr lang="en-US"/>
               <a:t>Click to edit Master text styles</a:t>
             </a:r>
           </a:p>
           <a:p>
             <a:pPr lvl="1"/>
             <a:r>
-              <a:rPr lang="en-US" smtClean="0"/>
+              <a:rPr lang="en-US"/>
               <a:t>Second level</a:t>
             </a:r>
           </a:p>
           <a:p>
             <a:pPr lvl="2"/>
             <a:r>
-              <a:rPr lang="en-US" smtClean="0"/>
+              <a:rPr lang="en-US"/>
               <a:t>Third level</a:t>
             </a:r>
           </a:p>
           <a:p>
             <a:pPr lvl="3"/>
             <a:r>
-              <a:rPr lang="en-US" smtClean="0"/>
+              <a:rPr lang="en-US"/>
               <a:t>Fourth level</a:t>
             </a:r>
           </a:p>
           <a:p>
             <a:pPr lvl="4"/>
             <a:r>
-              <a:rPr lang="en-US" smtClean="0"/>
+              <a:rPr lang="en-US"/>
               <a:t>Fifth level</a:t>
             </a:r>
-            <a:endParaRPr lang="en-US"/>
           </a:p>
         </p:txBody>
       </p:sp>
@@ -458,7 +471,7 @@
           <a:p>
             <a:fld id="{5BCAD085-E8A6-8845-BD4E-CB4CCA059FC4}" type="datetimeFigureOut">
               <a:rPr lang="en-US" smtClean="0"/>
-              <a:t>1/27/13</a:t>
+              <a:t>4/22/2025</a:t>
             </a:fld>
             <a:endParaRPr lang="en-US"/>
           </a:p>
@@ -557,10 +570,9 @@
           <a:lstStyle/>
           <a:p>
             <a:r>
-              <a:rPr lang="en-US" smtClean="0"/>
+              <a:rPr lang="en-US"/>
               <a:t>Click to edit Master title style</a:t>
             </a:r>
-            <a:endParaRPr lang="en-US"/>
           </a:p>
         </p:txBody>
       </p:sp>
@@ -586,38 +598,37 @@
           <a:p>
             <a:pPr lvl="0"/>
             <a:r>
-              <a:rPr lang="en-US" smtClean="0"/>
+              <a:rPr lang="en-US"/>
               <a:t>Click to edit Master text styles</a:t>
             </a:r>
           </a:p>
           <a:p>
             <a:pPr lvl="1"/>
             <a:r>
-              <a:rPr lang="en-US" smtClean="0"/>
+              <a:rPr lang="en-US"/>
               <a:t>Second level</a:t>
             </a:r>
           </a:p>
           <a:p>
             <a:pPr lvl="2"/>
             <a:r>
-              <a:rPr lang="en-US" smtClean="0"/>
+              <a:rPr lang="en-US"/>
               <a:t>Third level</a:t>
             </a:r>
           </a:p>
           <a:p>
             <a:pPr lvl="3"/>
             <a:r>
-              <a:rPr lang="en-US" smtClean="0"/>
+              <a:rPr lang="en-US"/>
               <a:t>Fourth level</a:t>
             </a:r>
           </a:p>
           <a:p>
             <a:pPr lvl="4"/>
             <a:r>
-              <a:rPr lang="en-US" smtClean="0"/>
+              <a:rPr lang="en-US"/>
               <a:t>Fifth level</a:t>
             </a:r>
-            <a:endParaRPr lang="en-US"/>
           </a:p>
         </p:txBody>
       </p:sp>
@@ -638,7 +649,7 @@
           <a:p>
             <a:fld id="{5BCAD085-E8A6-8845-BD4E-CB4CCA059FC4}" type="datetimeFigureOut">
               <a:rPr lang="en-US" smtClean="0"/>
-              <a:t>1/27/13</a:t>
+              <a:t>4/22/2025</a:t>
             </a:fld>
             <a:endParaRPr lang="en-US"/>
           </a:p>
@@ -732,10 +743,9 @@
           <a:lstStyle/>
           <a:p>
             <a:r>
-              <a:rPr lang="en-US" smtClean="0"/>
+              <a:rPr lang="en-US"/>
               <a:t>Click to edit Master title style</a:t>
             </a:r>
-            <a:endParaRPr lang="en-US"/>
           </a:p>
         </p:txBody>
       </p:sp>
@@ -756,38 +766,37 @@
           <a:p>
             <a:pPr lvl="0"/>
             <a:r>
-              <a:rPr lang="en-US" smtClean="0"/>
+              <a:rPr lang="en-US"/>
               <a:t>Click to edit Master text styles</a:t>
             </a:r>
           </a:p>
           <a:p>
             <a:pPr lvl="1"/>
             <a:r>
-              <a:rPr lang="en-US" smtClean="0"/>
+              <a:rPr lang="en-US"/>
               <a:t>Second level</a:t>
             </a:r>
           </a:p>
           <a:p>
             <a:pPr lvl="2"/>
             <a:r>
-              <a:rPr lang="en-US" smtClean="0"/>
+              <a:rPr lang="en-US"/>
               <a:t>Third level</a:t>
             </a:r>
           </a:p>
           <a:p>
             <a:pPr lvl="3"/>
             <a:r>
-              <a:rPr lang="en-US" smtClean="0"/>
+              <a:rPr lang="en-US"/>
               <a:t>Fourth level</a:t>
             </a:r>
           </a:p>
           <a:p>
             <a:pPr lvl="4"/>
             <a:r>
-              <a:rPr lang="en-US" smtClean="0"/>
+              <a:rPr lang="en-US"/>
               <a:t>Fifth level</a:t>
             </a:r>
-            <a:endParaRPr lang="en-US"/>
           </a:p>
         </p:txBody>
       </p:sp>
@@ -808,7 +817,7 @@
           <a:p>
             <a:fld id="{5BCAD085-E8A6-8845-BD4E-CB4CCA059FC4}" type="datetimeFigureOut">
               <a:rPr lang="en-US" smtClean="0"/>
-              <a:t>1/27/13</a:t>
+              <a:t>4/22/2025</a:t>
             </a:fld>
             <a:endParaRPr lang="en-US"/>
           </a:p>
@@ -911,10 +920,9 @@
           </a:lstStyle>
           <a:p>
             <a:r>
-              <a:rPr lang="en-US" smtClean="0"/>
+              <a:rPr lang="en-US"/>
               <a:t>Click to edit Master title style</a:t>
             </a:r>
-            <a:endParaRPr lang="en-US"/>
           </a:p>
         </p:txBody>
       </p:sp>
@@ -1031,7 +1039,7 @@
           <a:p>
             <a:pPr lvl="0"/>
             <a:r>
-              <a:rPr lang="en-US" smtClean="0"/>
+              <a:rPr lang="en-US"/>
               <a:t>Click to edit Master text styles</a:t>
             </a:r>
           </a:p>
@@ -1054,7 +1062,7 @@
           <a:p>
             <a:fld id="{5BCAD085-E8A6-8845-BD4E-CB4CCA059FC4}" type="datetimeFigureOut">
               <a:rPr lang="en-US" smtClean="0"/>
-              <a:t>1/27/13</a:t>
+              <a:t>4/22/2025</a:t>
             </a:fld>
             <a:endParaRPr lang="en-US"/>
           </a:p>
@@ -1148,10 +1156,9 @@
           <a:lstStyle/>
           <a:p>
             <a:r>
-              <a:rPr lang="en-US" smtClean="0"/>
+              <a:rPr lang="en-US"/>
               <a:t>Click to edit Master title style</a:t>
             </a:r>
-            <a:endParaRPr lang="en-US"/>
           </a:p>
         </p:txBody>
       </p:sp>
@@ -1205,38 +1212,37 @@
           <a:p>
             <a:pPr lvl="0"/>
             <a:r>
-              <a:rPr lang="en-US" smtClean="0"/>
+              <a:rPr lang="en-US"/>
               <a:t>Click to edit Master text styles</a:t>
             </a:r>
           </a:p>
           <a:p>
             <a:pPr lvl="1"/>
             <a:r>
-              <a:rPr lang="en-US" smtClean="0"/>
+              <a:rPr lang="en-US"/>
               <a:t>Second level</a:t>
             </a:r>
           </a:p>
           <a:p>
             <a:pPr lvl="2"/>
             <a:r>
-              <a:rPr lang="en-US" smtClean="0"/>
+              <a:rPr lang="en-US"/>
               <a:t>Third level</a:t>
             </a:r>
           </a:p>
           <a:p>
             <a:pPr lvl="3"/>
             <a:r>
-              <a:rPr lang="en-US" smtClean="0"/>
+              <a:rPr lang="en-US"/>
               <a:t>Fourth level</a:t>
             </a:r>
           </a:p>
           <a:p>
             <a:pPr lvl="4"/>
             <a:r>
-              <a:rPr lang="en-US" smtClean="0"/>
+              <a:rPr lang="en-US"/>
               <a:t>Fifth level</a:t>
             </a:r>
-            <a:endParaRPr lang="en-US"/>
           </a:p>
         </p:txBody>
       </p:sp>
@@ -1290,38 +1296,37 @@
           <a:p>
             <a:pPr lvl="0"/>
             <a:r>
-              <a:rPr lang="en-US" smtClean="0"/>
+              <a:rPr lang="en-US"/>
               <a:t>Click to edit Master text styles</a:t>
             </a:r>
           </a:p>
           <a:p>
             <a:pPr lvl="1"/>
             <a:r>
-              <a:rPr lang="en-US" smtClean="0"/>
+              <a:rPr lang="en-US"/>
               <a:t>Second level</a:t>
             </a:r>
           </a:p>
           <a:p>
             <a:pPr lvl="2"/>
             <a:r>
-              <a:rPr lang="en-US" smtClean="0"/>
+              <a:rPr lang="en-US"/>
               <a:t>Third level</a:t>
             </a:r>
           </a:p>
           <a:p>
             <a:pPr lvl="3"/>
             <a:r>
-              <a:rPr lang="en-US" smtClean="0"/>
+              <a:rPr lang="en-US"/>
               <a:t>Fourth level</a:t>
             </a:r>
           </a:p>
           <a:p>
             <a:pPr lvl="4"/>
             <a:r>
-              <a:rPr lang="en-US" smtClean="0"/>
+              <a:rPr lang="en-US"/>
               <a:t>Fifth level</a:t>
             </a:r>
-            <a:endParaRPr lang="en-US"/>
           </a:p>
         </p:txBody>
       </p:sp>
@@ -1342,7 +1347,7 @@
           <a:p>
             <a:fld id="{5BCAD085-E8A6-8845-BD4E-CB4CCA059FC4}" type="datetimeFigureOut">
               <a:rPr lang="en-US" smtClean="0"/>
-              <a:t>1/27/13</a:t>
+              <a:t>4/22/2025</a:t>
             </a:fld>
             <a:endParaRPr lang="en-US"/>
           </a:p>
@@ -1440,10 +1445,9 @@
           </a:lstStyle>
           <a:p>
             <a:r>
-              <a:rPr lang="en-US" smtClean="0"/>
+              <a:rPr lang="en-US"/>
               <a:t>Click to edit Master title style</a:t>
             </a:r>
-            <a:endParaRPr lang="en-US"/>
           </a:p>
         </p:txBody>
       </p:sp>
@@ -1506,7 +1510,7 @@
           <a:p>
             <a:pPr lvl="0"/>
             <a:r>
-              <a:rPr lang="en-US" smtClean="0"/>
+              <a:rPr lang="en-US"/>
               <a:t>Click to edit Master text styles</a:t>
             </a:r>
           </a:p>
@@ -1562,38 +1566,37 @@
           <a:p>
             <a:pPr lvl="0"/>
             <a:r>
-              <a:rPr lang="en-US" smtClean="0"/>
+              <a:rPr lang="en-US"/>
               <a:t>Click to edit Master text styles</a:t>
             </a:r>
           </a:p>
           <a:p>
             <a:pPr lvl="1"/>
             <a:r>
-              <a:rPr lang="en-US" smtClean="0"/>
+              <a:rPr lang="en-US"/>
               <a:t>Second level</a:t>
             </a:r>
           </a:p>
           <a:p>
             <a:pPr lvl="2"/>
             <a:r>
-              <a:rPr lang="en-US" smtClean="0"/>
+              <a:rPr lang="en-US"/>
               <a:t>Third level</a:t>
             </a:r>
           </a:p>
           <a:p>
             <a:pPr lvl="3"/>
             <a:r>
-              <a:rPr lang="en-US" smtClean="0"/>
+              <a:rPr lang="en-US"/>
               <a:t>Fourth level</a:t>
             </a:r>
           </a:p>
           <a:p>
             <a:pPr lvl="4"/>
             <a:r>
-              <a:rPr lang="en-US" smtClean="0"/>
+              <a:rPr lang="en-US"/>
               <a:t>Fifth level</a:t>
             </a:r>
-            <a:endParaRPr lang="en-US"/>
           </a:p>
         </p:txBody>
       </p:sp>
@@ -1656,7 +1659,7 @@
           <a:p>
             <a:pPr lvl="0"/>
             <a:r>
-              <a:rPr lang="en-US" smtClean="0"/>
+              <a:rPr lang="en-US"/>
               <a:t>Click to edit Master text styles</a:t>
             </a:r>
           </a:p>
@@ -1712,38 +1715,37 @@
           <a:p>
             <a:pPr lvl="0"/>
             <a:r>
-              <a:rPr lang="en-US" smtClean="0"/>
+              <a:rPr lang="en-US"/>
               <a:t>Click to edit Master text styles</a:t>
             </a:r>
           </a:p>
           <a:p>
             <a:pPr lvl="1"/>
             <a:r>
-              <a:rPr lang="en-US" smtClean="0"/>
+              <a:rPr lang="en-US"/>
               <a:t>Second level</a:t>
             </a:r>
           </a:p>
           <a:p>
             <a:pPr lvl="2"/>
             <a:r>
-              <a:rPr lang="en-US" smtClean="0"/>
+              <a:rPr lang="en-US"/>
               <a:t>Third level</a:t>
             </a:r>
           </a:p>
           <a:p>
             <a:pPr lvl="3"/>
             <a:r>
-              <a:rPr lang="en-US" smtClean="0"/>
+              <a:rPr lang="en-US"/>
               <a:t>Fourth level</a:t>
             </a:r>
           </a:p>
           <a:p>
             <a:pPr lvl="4"/>
             <a:r>
-              <a:rPr lang="en-US" smtClean="0"/>
+              <a:rPr lang="en-US"/>
               <a:t>Fifth level</a:t>
             </a:r>
-            <a:endParaRPr lang="en-US"/>
           </a:p>
         </p:txBody>
       </p:sp>
@@ -1764,7 +1766,7 @@
           <a:p>
             <a:fld id="{5BCAD085-E8A6-8845-BD4E-CB4CCA059FC4}" type="datetimeFigureOut">
               <a:rPr lang="en-US" smtClean="0"/>
-              <a:t>1/27/13</a:t>
+              <a:t>4/22/2025</a:t>
             </a:fld>
             <a:endParaRPr lang="en-US"/>
           </a:p>
@@ -1858,10 +1860,9 @@
           <a:lstStyle/>
           <a:p>
             <a:r>
-              <a:rPr lang="en-US" smtClean="0"/>
+              <a:rPr lang="en-US"/>
               <a:t>Click to edit Master title style</a:t>
             </a:r>
-            <a:endParaRPr lang="en-US"/>
           </a:p>
         </p:txBody>
       </p:sp>
@@ -1882,7 +1883,7 @@
           <a:p>
             <a:fld id="{5BCAD085-E8A6-8845-BD4E-CB4CCA059FC4}" type="datetimeFigureOut">
               <a:rPr lang="en-US" smtClean="0"/>
-              <a:t>1/27/13</a:t>
+              <a:t>4/22/2025</a:t>
             </a:fld>
             <a:endParaRPr lang="en-US"/>
           </a:p>
@@ -1977,7 +1978,7 @@
           <a:p>
             <a:fld id="{5BCAD085-E8A6-8845-BD4E-CB4CCA059FC4}" type="datetimeFigureOut">
               <a:rPr lang="en-US" smtClean="0"/>
-              <a:t>1/27/13</a:t>
+              <a:t>4/22/2025</a:t>
             </a:fld>
             <a:endParaRPr lang="en-US"/>
           </a:p>
@@ -2080,10 +2081,9 @@
           </a:lstStyle>
           <a:p>
             <a:r>
-              <a:rPr lang="en-US" smtClean="0"/>
+              <a:rPr lang="en-US"/>
               <a:t>Click to edit Master title style</a:t>
             </a:r>
-            <a:endParaRPr lang="en-US"/>
           </a:p>
         </p:txBody>
       </p:sp>
@@ -2137,38 +2137,37 @@
           <a:p>
             <a:pPr lvl="0"/>
             <a:r>
-              <a:rPr lang="en-US" smtClean="0"/>
+              <a:rPr lang="en-US"/>
               <a:t>Click to edit Master text styles</a:t>
             </a:r>
           </a:p>
           <a:p>
             <a:pPr lvl="1"/>
             <a:r>
-              <a:rPr lang="en-US" smtClean="0"/>
+              <a:rPr lang="en-US"/>
               <a:t>Second level</a:t>
             </a:r>
           </a:p>
           <a:p>
             <a:pPr lvl="2"/>
             <a:r>
-              <a:rPr lang="en-US" smtClean="0"/>
+              <a:rPr lang="en-US"/>
               <a:t>Third level</a:t>
             </a:r>
           </a:p>
           <a:p>
             <a:pPr lvl="3"/>
             <a:r>
-              <a:rPr lang="en-US" smtClean="0"/>
+              <a:rPr lang="en-US"/>
               <a:t>Fourth level</a:t>
             </a:r>
           </a:p>
           <a:p>
             <a:pPr lvl="4"/>
             <a:r>
-              <a:rPr lang="en-US" smtClean="0"/>
+              <a:rPr lang="en-US"/>
               <a:t>Fifth level</a:t>
             </a:r>
-            <a:endParaRPr lang="en-US"/>
           </a:p>
         </p:txBody>
       </p:sp>
@@ -2231,7 +2230,7 @@
           <a:p>
             <a:pPr lvl="0"/>
             <a:r>
-              <a:rPr lang="en-US" smtClean="0"/>
+              <a:rPr lang="en-US"/>
               <a:t>Click to edit Master text styles</a:t>
             </a:r>
           </a:p>
@@ -2254,7 +2253,7 @@
           <a:p>
             <a:fld id="{5BCAD085-E8A6-8845-BD4E-CB4CCA059FC4}" type="datetimeFigureOut">
               <a:rPr lang="en-US" smtClean="0"/>
-              <a:t>1/27/13</a:t>
+              <a:t>4/22/2025</a:t>
             </a:fld>
             <a:endParaRPr lang="en-US"/>
           </a:p>
@@ -2357,10 +2356,9 @@
           </a:lstStyle>
           <a:p>
             <a:r>
-              <a:rPr lang="en-US" smtClean="0"/>
+              <a:rPr lang="en-US"/>
               <a:t>Click to edit Master title style</a:t>
             </a:r>
-            <a:endParaRPr lang="en-US"/>
           </a:p>
         </p:txBody>
       </p:sp>
@@ -2484,7 +2482,7 @@
           <a:p>
             <a:pPr lvl="0"/>
             <a:r>
-              <a:rPr lang="en-US" smtClean="0"/>
+              <a:rPr lang="en-US"/>
               <a:t>Click to edit Master text styles</a:t>
             </a:r>
           </a:p>
@@ -2507,7 +2505,7 @@
           <a:p>
             <a:fld id="{5BCAD085-E8A6-8845-BD4E-CB4CCA059FC4}" type="datetimeFigureOut">
               <a:rPr lang="en-US" smtClean="0"/>
-              <a:t>1/27/13</a:t>
+              <a:t>4/22/2025</a:t>
             </a:fld>
             <a:endParaRPr lang="en-US"/>
           </a:p>
@@ -2616,10 +2614,9 @@
           <a:lstStyle/>
           <a:p>
             <a:r>
-              <a:rPr lang="en-US" smtClean="0"/>
+              <a:rPr lang="en-US"/>
               <a:t>Click to edit Master title style</a:t>
             </a:r>
-            <a:endParaRPr lang="en-US"/>
           </a:p>
         </p:txBody>
       </p:sp>
@@ -2650,38 +2647,37 @@
           <a:p>
             <a:pPr lvl="0"/>
             <a:r>
-              <a:rPr lang="en-US" smtClean="0"/>
+              <a:rPr lang="en-US"/>
               <a:t>Click to edit Master text styles</a:t>
             </a:r>
           </a:p>
           <a:p>
             <a:pPr lvl="1"/>
             <a:r>
-              <a:rPr lang="en-US" smtClean="0"/>
+              <a:rPr lang="en-US"/>
               <a:t>Second level</a:t>
             </a:r>
           </a:p>
           <a:p>
             <a:pPr lvl="2"/>
             <a:r>
-              <a:rPr lang="en-US" smtClean="0"/>
+              <a:rPr lang="en-US"/>
               <a:t>Third level</a:t>
             </a:r>
           </a:p>
           <a:p>
             <a:pPr lvl="3"/>
             <a:r>
-              <a:rPr lang="en-US" smtClean="0"/>
+              <a:rPr lang="en-US"/>
               <a:t>Fourth level</a:t>
             </a:r>
           </a:p>
           <a:p>
             <a:pPr lvl="4"/>
             <a:r>
-              <a:rPr lang="en-US" smtClean="0"/>
+              <a:rPr lang="en-US"/>
               <a:t>Fifth level</a:t>
             </a:r>
-            <a:endParaRPr lang="en-US"/>
           </a:p>
         </p:txBody>
       </p:sp>
@@ -2720,7 +2716,7 @@
           <a:p>
             <a:fld id="{5BCAD085-E8A6-8845-BD4E-CB4CCA059FC4}" type="datetimeFigureOut">
               <a:rPr lang="en-US" smtClean="0"/>
-              <a:t>1/27/13</a:t>
+              <a:t>4/22/2025</a:t>
             </a:fld>
             <a:endParaRPr lang="en-US"/>
           </a:p>
@@ -3079,7 +3075,7 @@
 </file>
 
 <file path=ppt/slides/slide1.xml><?xml version="1.0" encoding="utf-8"?>
-<p:sld xmlns:a="http://schemas.openxmlformats.org/drawingml/2006/main" xmlns:p="http://schemas.openxmlformats.org/presentationml/2006/main" xmlns:r="http://schemas.openxmlformats.org/officeDocument/2006/relationships">
+<p:sld xmlns:a="http://schemas.openxmlformats.org/drawingml/2006/main" xmlns:r="http://schemas.openxmlformats.org/officeDocument/2006/relationships" xmlns:p="http://schemas.openxmlformats.org/presentationml/2006/main">
   <p:cSld>
     <p:spTree>
       <p:nvGrpSpPr>
@@ -3087,7 +3083,14 @@
         <p:cNvGrpSpPr/>
         <p:nvPr/>
       </p:nvGrpSpPr>
-      <p:grpSpPr/>
+      <p:grpSpPr>
+        <a:xfrm>
+          <a:off x="0" y="0"/>
+          <a:ext cx="0" cy="0"/>
+          <a:chOff x="0" y="0"/>
+          <a:chExt cx="0" cy="0"/>
+        </a:xfrm>
+      </p:grpSpPr>
       <p:sp>
         <p:nvSpPr>
           <p:cNvPr id="2" name="Title 1"/>
@@ -3100,12 +3103,28 @@
         </p:nvSpPr>
         <p:spPr/>
         <p:txBody>
-          <a:bodyPr/>
-          <a:lstStyle/>
-          <a:p>
-            <a:r>
-              <a:t>MIPS Score Distribution by Specialty (Top 15)</a:t>
-            </a:r>
+          <a:bodyPr>
+            <a:noAutofit/>
+          </a:bodyPr>
+          <a:lstStyle/>
+          <a:p>
+            <a:r>
+              <a:rPr lang="en-GB" sz="3200" dirty="0"/>
+              <a:t>Top 15 Specialties by MIPS Score Distribution </a:t>
+            </a:r>
+            <a:r>
+              <a:rPr lang="en-GB" sz="2400" dirty="0">
+                <a:solidFill>
+                  <a:srgbClr val="FF0000"/>
+                </a:solidFill>
+              </a:rPr>
+              <a:t>2022 CMS Data</a:t>
+            </a:r>
+            <a:endParaRPr lang="en-GB" sz="3200" dirty="0">
+              <a:solidFill>
+                <a:srgbClr val="FF0000"/>
+              </a:solidFill>
+            </a:endParaRPr>
           </a:p>
         </p:txBody>
       </p:sp>
@@ -3125,7 +3144,7 @@
         </p:blipFill>
         <p:spPr>
           <a:xfrm>
-            <a:off x="457200" y="1097280"/>
+            <a:off x="457200" y="1575585"/>
             <a:ext cx="8001000" cy="4572000"/>
           </a:xfrm>
           <a:prstGeom prst="rect">
@@ -3134,6 +3153,182 @@
         </p:spPr>
       </p:pic>
     </p:spTree>
+  </p:cSld>
+  <p:clrMapOvr>
+    <a:masterClrMapping/>
+  </p:clrMapOvr>
+</p:sld>
+</file>
+
+<file path=ppt/slides/slide2.xml><?xml version="1.0" encoding="utf-8"?>
+<p:sld xmlns:a="http://schemas.openxmlformats.org/drawingml/2006/main" xmlns:r="http://schemas.openxmlformats.org/officeDocument/2006/relationships" xmlns:p="http://schemas.openxmlformats.org/presentationml/2006/main">
+  <p:cSld>
+    <p:spTree>
+      <p:nvGrpSpPr>
+        <p:cNvPr id="1" name=""/>
+        <p:cNvGrpSpPr/>
+        <p:nvPr/>
+      </p:nvGrpSpPr>
+      <p:grpSpPr>
+        <a:xfrm>
+          <a:off x="0" y="0"/>
+          <a:ext cx="0" cy="0"/>
+          <a:chOff x="0" y="0"/>
+          <a:chExt cx="0" cy="0"/>
+        </a:xfrm>
+      </p:grpSpPr>
+      <p:sp>
+        <p:nvSpPr>
+          <p:cNvPr id="2" name="Title 1">
+            <a:extLst>
+              <a:ext uri="{FF2B5EF4-FFF2-40B4-BE49-F238E27FC236}">
+                <a16:creationId xmlns:a16="http://schemas.microsoft.com/office/drawing/2014/main" id="{FA5B45FA-E9C4-98CC-1ABE-668BC5D60163}"/>
+              </a:ext>
+            </a:extLst>
+          </p:cNvPr>
+          <p:cNvSpPr>
+            <a:spLocks noGrp="1"/>
+          </p:cNvSpPr>
+          <p:nvPr>
+            <p:ph type="title"/>
+          </p:nvPr>
+        </p:nvSpPr>
+        <p:spPr/>
+        <p:txBody>
+          <a:bodyPr>
+            <a:normAutofit fontScale="90000"/>
+          </a:bodyPr>
+          <a:lstStyle/>
+          <a:p>
+            <a:r>
+              <a:rPr lang="en-GB" sz="4400" dirty="0"/>
+              <a:t>Top 15 Specialties by MIPS Score Distribution </a:t>
+            </a:r>
+            <a:r>
+              <a:rPr lang="en-GB" sz="3600" dirty="0">
+                <a:solidFill>
+                  <a:srgbClr val="FF0000"/>
+                </a:solidFill>
+              </a:rPr>
+              <a:t>2022 CMS Data</a:t>
+            </a:r>
+            <a:endParaRPr lang="en-GB" dirty="0"/>
+          </a:p>
+        </p:txBody>
+      </p:sp>
+      <p:sp>
+        <p:nvSpPr>
+          <p:cNvPr id="3" name="Content Placeholder 2">
+            <a:extLst>
+              <a:ext uri="{FF2B5EF4-FFF2-40B4-BE49-F238E27FC236}">
+                <a16:creationId xmlns:a16="http://schemas.microsoft.com/office/drawing/2014/main" id="{3F21488B-6BD4-A4BB-5188-5EC6B064C930}"/>
+              </a:ext>
+            </a:extLst>
+          </p:cNvPr>
+          <p:cNvSpPr>
+            <a:spLocks noGrp="1"/>
+          </p:cNvSpPr>
+          <p:nvPr>
+            <p:ph idx="1"/>
+          </p:nvPr>
+        </p:nvSpPr>
+        <p:spPr>
+          <a:xfrm>
+            <a:off x="457200" y="2166425"/>
+            <a:ext cx="8229600" cy="3959738"/>
+          </a:xfrm>
+        </p:spPr>
+        <p:txBody>
+          <a:bodyPr>
+            <a:normAutofit/>
+          </a:bodyPr>
+          <a:lstStyle/>
+          <a:p>
+            <a:r>
+              <a:rPr lang="en-GB" dirty="0"/>
+              <a:t>This boxplot shows </a:t>
+            </a:r>
+            <a:r>
+              <a:rPr lang="en-GB" b="1" dirty="0"/>
+              <a:t>MIPS score distributions </a:t>
+            </a:r>
+            <a:r>
+              <a:rPr lang="en-GB" dirty="0"/>
+              <a:t>for the </a:t>
+            </a:r>
+            <a:r>
+              <a:rPr lang="en-GB" dirty="0">
+                <a:solidFill>
+                  <a:srgbClr val="FF0000"/>
+                </a:solidFill>
+              </a:rPr>
+              <a:t>15 most common </a:t>
+            </a:r>
+            <a:r>
+              <a:rPr lang="en-GB" dirty="0"/>
+              <a:t>specialties.</a:t>
+            </a:r>
+          </a:p>
+          <a:p>
+            <a:r>
+              <a:rPr lang="en-GB" dirty="0"/>
+              <a:t>Boxes represent IQRs, lines show medians, and dots indicate outliers.</a:t>
+            </a:r>
+          </a:p>
+          <a:p>
+            <a:r>
+              <a:rPr lang="en-GB" dirty="0"/>
+              <a:t>Specialties like </a:t>
+            </a:r>
+            <a:r>
+              <a:rPr lang="en-GB" b="1" dirty="0"/>
+              <a:t>General Surgery </a:t>
+            </a:r>
+            <a:r>
+              <a:rPr lang="en-GB" dirty="0"/>
+              <a:t>and </a:t>
+            </a:r>
+            <a:r>
+              <a:rPr lang="en-GB" b="1" dirty="0"/>
+              <a:t>Cardiology</a:t>
+            </a:r>
+            <a:r>
+              <a:rPr lang="en-GB" dirty="0"/>
+              <a:t> </a:t>
+            </a:r>
+            <a:r>
+              <a:rPr lang="en-GB" i="1" u="sng" dirty="0"/>
+              <a:t>trend higher</a:t>
+            </a:r>
+            <a:r>
+              <a:rPr lang="en-GB" dirty="0"/>
+              <a:t>, while </a:t>
+            </a:r>
+            <a:r>
+              <a:rPr lang="en-GB" b="1" dirty="0"/>
+              <a:t>Emergency Medicine</a:t>
+            </a:r>
+            <a:r>
+              <a:rPr lang="en-GB" dirty="0"/>
+              <a:t> shows </a:t>
+            </a:r>
+            <a:r>
+              <a:rPr lang="en-GB" i="1" u="sng" dirty="0"/>
+              <a:t>wider variability</a:t>
+            </a:r>
+            <a:r>
+              <a:rPr lang="en-GB" dirty="0"/>
+              <a:t>.</a:t>
+            </a:r>
+          </a:p>
+        </p:txBody>
+      </p:sp>
+    </p:spTree>
+    <p:extLst>
+      <p:ext uri="{BB962C8B-B14F-4D97-AF65-F5344CB8AC3E}">
+        <p14:creationId xmlns:p14="http://schemas.microsoft.com/office/powerpoint/2010/main" val="1524410099"/>
+      </p:ext>
+    </p:extLst>
   </p:cSld>
   <p:clrMapOvr>
     <a:masterClrMapping/>

</xml_diff>